<commit_message>
Done best fit, now going to look at outliers
</commit_message>
<xml_diff>
--- a/Homogeneity In Ejecta Velocity Of Type Ia Supernovae.pptx
+++ b/Homogeneity In Ejecta Velocity Of Type Ia Supernovae.pptx
@@ -5,10 +5,10 @@
     <p:sldMasterId id="2147483696" r:id="rId4"/>
   </p:sldMasterIdLst>
   <p:notesMasterIdLst>
-    <p:notesMasterId r:id="rId10"/>
+    <p:notesMasterId r:id="rId16"/>
   </p:notesMasterIdLst>
   <p:handoutMasterIdLst>
-    <p:handoutMasterId r:id="rId11"/>
+    <p:handoutMasterId r:id="rId17"/>
   </p:handoutMasterIdLst>
   <p:sldIdLst>
     <p:sldId id="334" r:id="rId5"/>
@@ -16,6 +16,12 @@
     <p:sldId id="336" r:id="rId7"/>
     <p:sldId id="335" r:id="rId8"/>
     <p:sldId id="337" r:id="rId9"/>
+    <p:sldId id="339" r:id="rId10"/>
+    <p:sldId id="340" r:id="rId11"/>
+    <p:sldId id="338" r:id="rId12"/>
+    <p:sldId id="342" r:id="rId13"/>
+    <p:sldId id="341" r:id="rId14"/>
+    <p:sldId id="343" r:id="rId15"/>
   </p:sldIdLst>
   <p:sldSz cx="12192000" cy="6858000"/>
   <p:notesSz cx="6858000" cy="9144000"/>
@@ -844,6 +850,114 @@
     <p:extLst>
       <p:ext uri="{BB962C8B-B14F-4D97-AF65-F5344CB8AC3E}">
         <p14:creationId xmlns:p14="http://schemas.microsoft.com/office/powerpoint/2010/main" val="3466773405"/>
+      </p:ext>
+    </p:extLst>
+  </p:cSld>
+  <p:clrMapOvr>
+    <a:masterClrMapping/>
+  </p:clrMapOvr>
+</p:notes>
+</file>
+
+<file path=ppt/notesSlides/notesSlide3.xml><?xml version="1.0" encoding="utf-8"?>
+<p:notes xmlns:a="http://schemas.openxmlformats.org/drawingml/2006/main" xmlns:r="http://schemas.openxmlformats.org/officeDocument/2006/relationships" xmlns:p="http://schemas.openxmlformats.org/presentationml/2006/main">
+  <p:cSld>
+    <p:spTree>
+      <p:nvGrpSpPr>
+        <p:cNvPr id="1" name="">
+          <a:extLst>
+            <a:ext uri="{FF2B5EF4-FFF2-40B4-BE49-F238E27FC236}">
+              <a16:creationId xmlns:a16="http://schemas.microsoft.com/office/drawing/2014/main" id="{9410FDDF-C79E-2D6C-45D1-51CF63D861F8}"/>
+            </a:ext>
+          </a:extLst>
+        </p:cNvPr>
+        <p:cNvGrpSpPr/>
+        <p:nvPr/>
+      </p:nvGrpSpPr>
+      <p:grpSpPr>
+        <a:xfrm>
+          <a:off x="0" y="0"/>
+          <a:ext cx="0" cy="0"/>
+          <a:chOff x="0" y="0"/>
+          <a:chExt cx="0" cy="0"/>
+        </a:xfrm>
+      </p:grpSpPr>
+      <p:sp>
+        <p:nvSpPr>
+          <p:cNvPr id="2" name="Slide Image Placeholder 1">
+            <a:extLst>
+              <a:ext uri="{FF2B5EF4-FFF2-40B4-BE49-F238E27FC236}">
+                <a16:creationId xmlns:a16="http://schemas.microsoft.com/office/drawing/2014/main" id="{909016D9-BED3-BCC8-4D42-AD95B4FA85AA}"/>
+              </a:ext>
+            </a:extLst>
+          </p:cNvPr>
+          <p:cNvSpPr>
+            <a:spLocks noGrp="1" noRot="1" noChangeAspect="1"/>
+          </p:cNvSpPr>
+          <p:nvPr>
+            <p:ph type="sldImg"/>
+          </p:nvPr>
+        </p:nvSpPr>
+        <p:spPr/>
+      </p:sp>
+      <p:sp>
+        <p:nvSpPr>
+          <p:cNvPr id="3" name="Notes Placeholder 2">
+            <a:extLst>
+              <a:ext uri="{FF2B5EF4-FFF2-40B4-BE49-F238E27FC236}">
+                <a16:creationId xmlns:a16="http://schemas.microsoft.com/office/drawing/2014/main" id="{89888FB9-74CF-E065-9553-3867CBE3ECD6}"/>
+              </a:ext>
+            </a:extLst>
+          </p:cNvPr>
+          <p:cNvSpPr>
+            <a:spLocks noGrp="1"/>
+          </p:cNvSpPr>
+          <p:nvPr>
+            <p:ph type="body" idx="1"/>
+          </p:nvPr>
+        </p:nvSpPr>
+        <p:spPr/>
+        <p:txBody>
+          <a:bodyPr/>
+          <a:lstStyle/>
+          <a:p>
+            <a:endParaRPr lang="en-US" dirty="0"/>
+          </a:p>
+        </p:txBody>
+      </p:sp>
+      <p:sp>
+        <p:nvSpPr>
+          <p:cNvPr id="4" name="Slide Number Placeholder 3">
+            <a:extLst>
+              <a:ext uri="{FF2B5EF4-FFF2-40B4-BE49-F238E27FC236}">
+                <a16:creationId xmlns:a16="http://schemas.microsoft.com/office/drawing/2014/main" id="{0FCF52CE-1BFA-9EF1-72E7-192277B3AF71}"/>
+              </a:ext>
+            </a:extLst>
+          </p:cNvPr>
+          <p:cNvSpPr>
+            <a:spLocks noGrp="1"/>
+          </p:cNvSpPr>
+          <p:nvPr>
+            <p:ph type="sldNum" sz="quarter" idx="5"/>
+          </p:nvPr>
+        </p:nvSpPr>
+        <p:spPr/>
+        <p:txBody>
+          <a:bodyPr/>
+          <a:lstStyle/>
+          <a:p>
+            <a:fld id="{D5939589-3E79-4C82-AA4A-FE78234FAA59}" type="slidenum">
+              <a:rPr lang="en-US" smtClean="0"/>
+              <a:t>6</a:t>
+            </a:fld>
+            <a:endParaRPr lang="en-US" dirty="0"/>
+          </a:p>
+        </p:txBody>
+      </p:sp>
+    </p:spTree>
+    <p:extLst>
+      <p:ext uri="{BB962C8B-B14F-4D97-AF65-F5344CB8AC3E}">
+        <p14:creationId xmlns:p14="http://schemas.microsoft.com/office/powerpoint/2010/main" val="618604100"/>
       </p:ext>
     </p:extLst>
   </p:cSld>
@@ -10877,6 +10991,188 @@
 </p:sld>
 </file>
 
+<file path=ppt/slides/slide10.xml><?xml version="1.0" encoding="utf-8"?>
+<p:sld xmlns:a="http://schemas.openxmlformats.org/drawingml/2006/main" xmlns:r="http://schemas.openxmlformats.org/officeDocument/2006/relationships" xmlns:p="http://schemas.openxmlformats.org/presentationml/2006/main">
+  <p:cSld>
+    <p:spTree>
+      <p:nvGrpSpPr>
+        <p:cNvPr id="1" name=""/>
+        <p:cNvGrpSpPr/>
+        <p:nvPr/>
+      </p:nvGrpSpPr>
+      <p:grpSpPr>
+        <a:xfrm>
+          <a:off x="0" y="0"/>
+          <a:ext cx="0" cy="0"/>
+          <a:chOff x="0" y="0"/>
+          <a:chExt cx="0" cy="0"/>
+        </a:xfrm>
+      </p:grpSpPr>
+      <p:sp>
+        <p:nvSpPr>
+          <p:cNvPr id="8" name="TextBox 7">
+            <a:extLst>
+              <a:ext uri="{FF2B5EF4-FFF2-40B4-BE49-F238E27FC236}">
+                <a16:creationId xmlns:a16="http://schemas.microsoft.com/office/drawing/2014/main" id="{262717A8-BD3E-A8E5-A4BD-A6DBEB9E1590}"/>
+              </a:ext>
+            </a:extLst>
+          </p:cNvPr>
+          <p:cNvSpPr txBox="1"/>
+          <p:nvPr/>
+        </p:nvSpPr>
+        <p:spPr>
+          <a:xfrm>
+            <a:off x="1280160" y="640080"/>
+            <a:ext cx="10087699" cy="1280160"/>
+          </a:xfrm>
+          <a:prstGeom prst="rect">
+            <a:avLst/>
+          </a:prstGeom>
+        </p:spPr>
+        <p:txBody>
+          <a:bodyPr vert="horz" lIns="0" tIns="0" rIns="0" bIns="0" rtlCol="0" anchor="b" anchorCtr="0">
+            <a:normAutofit/>
+          </a:bodyPr>
+          <a:lstStyle/>
+          <a:p>
+            <a:pPr>
+              <a:lnSpc>
+                <a:spcPts val="4000"/>
+              </a:lnSpc>
+              <a:spcBef>
+                <a:spcPct val="0"/>
+              </a:spcBef>
+              <a:spcAft>
+                <a:spcPts val="600"/>
+              </a:spcAft>
+            </a:pPr>
+            <a:r>
+              <a:rPr lang="en-US" sz="4000" b="1" kern="1200" cap="all" baseline="0">
+                <a:latin typeface="+mj-lt"/>
+                <a:ea typeface="+mj-ea"/>
+                <a:cs typeface="+mj-cs"/>
+              </a:rPr>
+              <a:t>KDE/Histogram</a:t>
+            </a:r>
+          </a:p>
+        </p:txBody>
+      </p:sp>
+      <p:pic>
+        <p:nvPicPr>
+          <p:cNvPr id="10" name="Picture 9">
+            <a:extLst>
+              <a:ext uri="{FF2B5EF4-FFF2-40B4-BE49-F238E27FC236}">
+                <a16:creationId xmlns:a16="http://schemas.microsoft.com/office/drawing/2014/main" id="{BD933012-031A-BBBF-B853-F481CAE1D82E}"/>
+              </a:ext>
+            </a:extLst>
+          </p:cNvPr>
+          <p:cNvPicPr>
+            <a:picLocks noChangeAspect="1"/>
+          </p:cNvPicPr>
+          <p:nvPr/>
+        </p:nvPicPr>
+        <p:blipFill>
+          <a:blip r:embed="rId2"/>
+          <a:srcRect l="4688" r="4688"/>
+          <a:stretch/>
+        </p:blipFill>
+        <p:spPr>
+          <a:xfrm>
+            <a:off x="1352016" y="2103119"/>
+            <a:ext cx="9943987" cy="4114800"/>
+          </a:xfrm>
+          <a:prstGeom prst="rect">
+            <a:avLst/>
+          </a:prstGeom>
+          <a:noFill/>
+          <a:effectLst>
+            <a:softEdge rad="0"/>
+          </a:effectLst>
+        </p:spPr>
+      </p:pic>
+    </p:spTree>
+    <p:extLst>
+      <p:ext uri="{BB962C8B-B14F-4D97-AF65-F5344CB8AC3E}">
+        <p14:creationId xmlns:p14="http://schemas.microsoft.com/office/powerpoint/2010/main" val="388589599"/>
+      </p:ext>
+    </p:extLst>
+  </p:cSld>
+  <p:clrMapOvr>
+    <a:masterClrMapping/>
+  </p:clrMapOvr>
+</p:sld>
+</file>
+
+<file path=ppt/slides/slide11.xml><?xml version="1.0" encoding="utf-8"?>
+<p:sld xmlns:a="http://schemas.openxmlformats.org/drawingml/2006/main" xmlns:r="http://schemas.openxmlformats.org/officeDocument/2006/relationships" xmlns:p="http://schemas.openxmlformats.org/presentationml/2006/main">
+  <p:cSld>
+    <p:spTree>
+      <p:nvGrpSpPr>
+        <p:cNvPr id="1" name=""/>
+        <p:cNvGrpSpPr/>
+        <p:nvPr/>
+      </p:nvGrpSpPr>
+      <p:grpSpPr>
+        <a:xfrm>
+          <a:off x="0" y="0"/>
+          <a:ext cx="0" cy="0"/>
+          <a:chOff x="0" y="0"/>
+          <a:chExt cx="0" cy="0"/>
+        </a:xfrm>
+      </p:grpSpPr>
+      <p:sp>
+        <p:nvSpPr>
+          <p:cNvPr id="3" name="TextBox 2">
+            <a:extLst>
+              <a:ext uri="{FF2B5EF4-FFF2-40B4-BE49-F238E27FC236}">
+                <a16:creationId xmlns:a16="http://schemas.microsoft.com/office/drawing/2014/main" id="{CA1FE41D-BDDC-9ADB-32ED-6582B4CC68CF}"/>
+              </a:ext>
+            </a:extLst>
+          </p:cNvPr>
+          <p:cNvSpPr txBox="1"/>
+          <p:nvPr/>
+        </p:nvSpPr>
+        <p:spPr>
+          <a:xfrm>
+            <a:off x="3680920" y="327933"/>
+            <a:ext cx="4830169" cy="707886"/>
+          </a:xfrm>
+          <a:prstGeom prst="rect">
+            <a:avLst/>
+          </a:prstGeom>
+          <a:noFill/>
+        </p:spPr>
+        <p:txBody>
+          <a:bodyPr wrap="none" rtlCol="0">
+            <a:spAutoFit/>
+          </a:bodyPr>
+          <a:lstStyle/>
+          <a:p>
+            <a:pPr algn="ctr"/>
+            <a:r>
+              <a:rPr lang="en-US" sz="4000" b="1" dirty="0">
+                <a:solidFill>
+                  <a:schemeClr val="bg1"/>
+                </a:solidFill>
+              </a:rPr>
+              <a:t>Probability Density</a:t>
+            </a:r>
+          </a:p>
+        </p:txBody>
+      </p:sp>
+    </p:spTree>
+    <p:extLst>
+      <p:ext uri="{BB962C8B-B14F-4D97-AF65-F5344CB8AC3E}">
+        <p14:creationId xmlns:p14="http://schemas.microsoft.com/office/powerpoint/2010/main" val="2623467820"/>
+      </p:ext>
+    </p:extLst>
+  </p:cSld>
+  <p:clrMapOvr>
+    <a:masterClrMapping/>
+  </p:clrMapOvr>
+</p:sld>
+</file>
+
 <file path=ppt/slides/slide2.xml><?xml version="1.0" encoding="utf-8"?>
 <p:sld xmlns:a="http://schemas.openxmlformats.org/drawingml/2006/main" xmlns:r="http://schemas.openxmlformats.org/officeDocument/2006/relationships" xmlns:p="http://schemas.openxmlformats.org/presentationml/2006/main">
   <p:cSld>
@@ -10894,8 +11190,8 @@
           <a:chExt cx="0" cy="0"/>
         </a:xfrm>
       </p:grpSpPr>
-      <mc:AlternateContent xmlns:mc="http://schemas.openxmlformats.org/markup-compatibility/2006">
-        <mc:Choice xmlns:a14="http://schemas.microsoft.com/office/drawing/2010/main" Requires="a14">
+      <mc:AlternateContent xmlns:mc="http://schemas.openxmlformats.org/markup-compatibility/2006" xmlns:a14="http://schemas.microsoft.com/office/drawing/2010/main">
+        <mc:Choice Requires="a14">
           <p:sp>
             <p:nvSpPr>
               <p:cNvPr id="10" name="Text Placeholder 9">
@@ -11027,7 +11323,7 @@
             </p:txBody>
           </p:sp>
         </mc:Choice>
-        <mc:Fallback>
+        <mc:Fallback xmlns="">
           <p:sp>
             <p:nvSpPr>
               <p:cNvPr id="10" name="Text Placeholder 9">
@@ -11140,6 +11436,45 @@
           </a:prstGeom>
         </p:spPr>
       </p:pic>
+      <p:sp>
+        <p:nvSpPr>
+          <p:cNvPr id="18" name="TextBox 17">
+            <a:extLst>
+              <a:ext uri="{FF2B5EF4-FFF2-40B4-BE49-F238E27FC236}">
+                <a16:creationId xmlns:a16="http://schemas.microsoft.com/office/drawing/2014/main" id="{44384DDF-BCBC-9766-BDCB-F05B8D96F66E}"/>
+              </a:ext>
+            </a:extLst>
+          </p:cNvPr>
+          <p:cNvSpPr txBox="1"/>
+          <p:nvPr/>
+        </p:nvSpPr>
+        <p:spPr>
+          <a:xfrm>
+            <a:off x="923925" y="5400675"/>
+            <a:ext cx="1241045" cy="200055"/>
+          </a:xfrm>
+          <a:prstGeom prst="rect">
+            <a:avLst/>
+          </a:prstGeom>
+          <a:noFill/>
+        </p:spPr>
+        <p:txBody>
+          <a:bodyPr wrap="none" rtlCol="0">
+            <a:spAutoFit/>
+          </a:bodyPr>
+          <a:lstStyle/>
+          <a:p>
+            <a:r>
+              <a:rPr lang="en-US" sz="700" dirty="0">
+                <a:solidFill>
+                  <a:schemeClr val="bg1"/>
+                </a:solidFill>
+              </a:rPr>
+              <a:t>Credit: Linda Hall Library</a:t>
+            </a:r>
+          </a:p>
+        </p:txBody>
+      </p:sp>
     </p:spTree>
     <p:extLst>
       <p:ext uri="{BB962C8B-B14F-4D97-AF65-F5344CB8AC3E}">
@@ -11248,7 +11583,7 @@
                   <a:schemeClr val="bg1"/>
                 </a:solidFill>
               </a:rPr>
-              <a:t>What shape does the distribution of ejecta velocities take (e.g. Gaussian, bimodal, etc.)?</a:t>
+              <a:t>What shape does the distribution of ejecta velocities take (e.g. gaussian, bimodal, etc.)?</a:t>
             </a:r>
           </a:p>
           <a:p>
@@ -11373,8 +11708,8 @@
           </a:p>
         </p:txBody>
       </p:sp>
-      <mc:AlternateContent xmlns:mc="http://schemas.openxmlformats.org/markup-compatibility/2006">
-        <mc:Choice xmlns:a14="http://schemas.microsoft.com/office/drawing/2010/main" Requires="a14">
+      <mc:AlternateContent xmlns:mc="http://schemas.openxmlformats.org/markup-compatibility/2006" xmlns:a14="http://schemas.microsoft.com/office/drawing/2010/main">
+        <mc:Choice Requires="a14">
           <p:sp>
             <p:nvSpPr>
               <p:cNvPr id="6" name="TextBox 5">
@@ -11420,16 +11755,10 @@
                 <a14:m>
                   <m:oMath xmlns:m="http://schemas.openxmlformats.org/officeDocument/2006/math">
                     <m:r>
-                      <a:rPr lang="en-US" i="1" dirty="0" smtClean="0"/>
-                      <m:t>67</m:t>
-                    </m:r>
-                    <m:r>
-                      <a:rPr lang="en-US" i="1" dirty="0" smtClean="0"/>
-                      <m:t>,</m:t>
-                    </m:r>
-                    <m:r>
-                      <a:rPr lang="en-US" i="1" dirty="0" smtClean="0"/>
-                      <m:t>934</m:t>
+                      <a:rPr lang="en-US" i="1" dirty="0" smtClean="0">
+                        <a:latin typeface="Cambria Math" panose="02040503050406030204" pitchFamily="18" charset="0"/>
+                      </a:rPr>
+                      <m:t>67,934</m:t>
                     </m:r>
                   </m:oMath>
                 </a14:m>
@@ -11446,16 +11775,10 @@
                 <a14:m>
                   <m:oMath xmlns:m="http://schemas.openxmlformats.org/officeDocument/2006/math">
                     <m:r>
-                      <a:rPr lang="en-US" b="0" i="1" smtClean="0"/>
-                      <m:t>26</m:t>
-                    </m:r>
-                    <m:r>
-                      <a:rPr lang="en-US" b="0" i="1" smtClean="0"/>
-                      <m:t>,</m:t>
-                    </m:r>
-                    <m:r>
-                      <a:rPr lang="en-US" b="0" i="1" smtClean="0"/>
-                      <m:t>932</m:t>
+                      <a:rPr lang="en-US" b="0" i="1" smtClean="0">
+                        <a:latin typeface="Cambria Math" panose="02040503050406030204" pitchFamily="18" charset="0"/>
+                      </a:rPr>
+                      <m:t>26,932</m:t>
                     </m:r>
                   </m:oMath>
                 </a14:m>
@@ -11538,7 +11861,7 @@
             </p:txBody>
           </p:sp>
         </mc:Choice>
-        <mc:Fallback>
+        <mc:Fallback xmlns="">
           <p:sp>
             <p:nvSpPr>
               <p:cNvPr id="6" name="TextBox 5">
@@ -11659,6 +11982,195 @@
           </a:p>
         </p:txBody>
       </p:sp>
+      <p:sp>
+        <p:nvSpPr>
+          <p:cNvPr id="7" name="TextBox 6">
+            <a:extLst>
+              <a:ext uri="{FF2B5EF4-FFF2-40B4-BE49-F238E27FC236}">
+                <a16:creationId xmlns:a16="http://schemas.microsoft.com/office/drawing/2014/main" id="{4F7E64C6-24B8-600F-5E6E-61B70329F154}"/>
+              </a:ext>
+            </a:extLst>
+          </p:cNvPr>
+          <p:cNvSpPr txBox="1"/>
+          <p:nvPr/>
+        </p:nvSpPr>
+        <p:spPr>
+          <a:xfrm>
+            <a:off x="1981200" y="1590675"/>
+            <a:ext cx="7962900" cy="2308324"/>
+          </a:xfrm>
+          <a:prstGeom prst="rect">
+            <a:avLst/>
+          </a:prstGeom>
+          <a:noFill/>
+        </p:spPr>
+        <p:txBody>
+          <a:bodyPr wrap="square" rtlCol="0">
+            <a:spAutoFit/>
+          </a:bodyPr>
+          <a:lstStyle/>
+          <a:p>
+            <a:pPr marL="342900" indent="-342900">
+              <a:buFont typeface="Arial" panose="020B0604020202020204" pitchFamily="34" charset="0"/>
+              <a:buChar char="•"/>
+            </a:pPr>
+            <a:r>
+              <a:rPr lang="en-US" sz="2400" dirty="0">
+                <a:solidFill>
+                  <a:schemeClr val="bg1"/>
+                </a:solidFill>
+              </a:rPr>
+              <a:t>Select data</a:t>
+            </a:r>
+          </a:p>
+          <a:p>
+            <a:pPr marL="342900" indent="-342900">
+              <a:buFont typeface="Arial" panose="020B0604020202020204" pitchFamily="34" charset="0"/>
+              <a:buChar char="•"/>
+            </a:pPr>
+            <a:r>
+              <a:rPr lang="en-US" sz="2400" dirty="0">
+                <a:solidFill>
+                  <a:schemeClr val="bg1"/>
+                </a:solidFill>
+              </a:rPr>
+              <a:t>Calculate metadata</a:t>
+            </a:r>
+          </a:p>
+          <a:p>
+            <a:pPr marL="342900" indent="-342900">
+              <a:buFont typeface="Arial" panose="020B0604020202020204" pitchFamily="34" charset="0"/>
+              <a:buChar char="•"/>
+            </a:pPr>
+            <a:r>
+              <a:rPr lang="en-US" sz="2400" dirty="0">
+                <a:solidFill>
+                  <a:schemeClr val="bg1"/>
+                </a:solidFill>
+              </a:rPr>
+              <a:t>Filter data using metadata</a:t>
+            </a:r>
+          </a:p>
+          <a:p>
+            <a:pPr marL="342900" indent="-342900">
+              <a:buFont typeface="Arial" panose="020B0604020202020204" pitchFamily="34" charset="0"/>
+              <a:buChar char="•"/>
+            </a:pPr>
+            <a:r>
+              <a:rPr lang="en-US" sz="2400" dirty="0">
+                <a:solidFill>
+                  <a:schemeClr val="bg1"/>
+                </a:solidFill>
+              </a:rPr>
+              <a:t>Preprocess</a:t>
+            </a:r>
+          </a:p>
+          <a:p>
+            <a:pPr marL="342900" indent="-342900">
+              <a:buFont typeface="Arial" panose="020B0604020202020204" pitchFamily="34" charset="0"/>
+              <a:buChar char="•"/>
+            </a:pPr>
+            <a:r>
+              <a:rPr lang="en-US" sz="2400" dirty="0">
+                <a:solidFill>
+                  <a:schemeClr val="bg1"/>
+                </a:solidFill>
+              </a:rPr>
+              <a:t>Filter out bad data (if necessary)</a:t>
+            </a:r>
+          </a:p>
+          <a:p>
+            <a:pPr marL="342900" indent="-342900">
+              <a:buFont typeface="Arial" panose="020B0604020202020204" pitchFamily="34" charset="0"/>
+              <a:buChar char="•"/>
+            </a:pPr>
+            <a:r>
+              <a:rPr lang="en-US" sz="2400" dirty="0">
+                <a:solidFill>
+                  <a:schemeClr val="bg1"/>
+                </a:solidFill>
+              </a:rPr>
+              <a:t>Fit gaussian around KDE/histogram</a:t>
+            </a:r>
+          </a:p>
+        </p:txBody>
+      </p:sp>
+    </p:spTree>
+    <p:extLst>
+      <p:ext uri="{BB962C8B-B14F-4D97-AF65-F5344CB8AC3E}">
+        <p14:creationId xmlns:p14="http://schemas.microsoft.com/office/powerpoint/2010/main" val="3099713292"/>
+      </p:ext>
+    </p:extLst>
+  </p:cSld>
+  <p:clrMapOvr>
+    <a:masterClrMapping/>
+  </p:clrMapOvr>
+</p:sld>
+</file>
+
+<file path=ppt/slides/slide6.xml><?xml version="1.0" encoding="utf-8"?>
+<p:sld xmlns:a="http://schemas.openxmlformats.org/drawingml/2006/main" xmlns:r="http://schemas.openxmlformats.org/officeDocument/2006/relationships" xmlns:p="http://schemas.openxmlformats.org/presentationml/2006/main">
+  <p:cSld>
+    <p:spTree>
+      <p:nvGrpSpPr>
+        <p:cNvPr id="1" name="">
+          <a:extLst>
+            <a:ext uri="{FF2B5EF4-FFF2-40B4-BE49-F238E27FC236}">
+              <a16:creationId xmlns:a16="http://schemas.microsoft.com/office/drawing/2014/main" id="{91DCA42C-AB85-EFDA-37C7-823BAC529C88}"/>
+            </a:ext>
+          </a:extLst>
+        </p:cNvPr>
+        <p:cNvGrpSpPr/>
+        <p:nvPr/>
+      </p:nvGrpSpPr>
+      <p:grpSpPr>
+        <a:xfrm>
+          <a:off x="0" y="0"/>
+          <a:ext cx="0" cy="0"/>
+          <a:chOff x="0" y="0"/>
+          <a:chExt cx="0" cy="0"/>
+        </a:xfrm>
+      </p:grpSpPr>
+      <p:sp>
+        <p:nvSpPr>
+          <p:cNvPr id="4" name="TextBox 3">
+            <a:extLst>
+              <a:ext uri="{FF2B5EF4-FFF2-40B4-BE49-F238E27FC236}">
+                <a16:creationId xmlns:a16="http://schemas.microsoft.com/office/drawing/2014/main" id="{0A0089C5-923B-4C73-ED26-5FBDAE5AE1E4}"/>
+              </a:ext>
+            </a:extLst>
+          </p:cNvPr>
+          <p:cNvSpPr txBox="1"/>
+          <p:nvPr/>
+        </p:nvSpPr>
+        <p:spPr>
+          <a:xfrm>
+            <a:off x="3750665" y="413658"/>
+            <a:ext cx="4690708" cy="707886"/>
+          </a:xfrm>
+          <a:prstGeom prst="rect">
+            <a:avLst/>
+          </a:prstGeom>
+          <a:noFill/>
+        </p:spPr>
+        <p:txBody>
+          <a:bodyPr wrap="none" rtlCol="0">
+            <a:spAutoFit/>
+          </a:bodyPr>
+          <a:lstStyle/>
+          <a:p>
+            <a:pPr algn="ctr"/>
+            <a:r>
+              <a:rPr lang="en-US" sz="4000" b="1" dirty="0">
+                <a:solidFill>
+                  <a:schemeClr val="bg1"/>
+                </a:solidFill>
+              </a:rPr>
+              <a:t>Metadata Filtering</a:t>
+            </a:r>
+          </a:p>
+        </p:txBody>
+      </p:sp>
       <mc:AlternateContent xmlns:mc="http://schemas.openxmlformats.org/markup-compatibility/2006">
         <mc:Choice xmlns:a14="http://schemas.microsoft.com/office/drawing/2010/main" Requires="a14">
           <p:sp>
@@ -11666,7 +12178,7 @@
               <p:cNvPr id="7" name="TextBox 6">
                 <a:extLst>
                   <a:ext uri="{FF2B5EF4-FFF2-40B4-BE49-F238E27FC236}">
-                    <a16:creationId xmlns:a16="http://schemas.microsoft.com/office/drawing/2014/main" id="{4F7E64C6-24B8-600F-5E6E-61B70329F154}"/>
+                    <a16:creationId xmlns:a16="http://schemas.microsoft.com/office/drawing/2014/main" id="{A2C0AE6B-BEF9-C5AF-A9F4-11C126F2117A}"/>
                   </a:ext>
                 </a:extLst>
               </p:cNvPr>
@@ -11675,8 +12187,8 @@
             </p:nvSpPr>
             <p:spPr>
               <a:xfrm>
-                <a:off x="1981200" y="1590675"/>
-                <a:ext cx="7962900" cy="2726067"/>
+                <a:off x="1457325" y="1377103"/>
+                <a:ext cx="2914650" cy="1037720"/>
               </a:xfrm>
               <a:prstGeom prst="rect">
                 <a:avLst/>
@@ -11699,11 +12211,11 @@
                       <a:schemeClr val="bg1"/>
                     </a:solidFill>
                   </a:rPr>
-                  <a:t>Select data</a:t>
+                  <a:t>Signal to Noise</a:t>
                 </a:r>
               </a:p>
               <a:p>
-                <a:pPr marL="342900" indent="-342900">
+                <a:pPr marL="800100" lvl="1" indent="-342900">
                   <a:buFont typeface="Arial" panose="020B0604020202020204" pitchFamily="34" charset="0"/>
                   <a:buChar char="•"/>
                 </a:pPr>
@@ -11713,89 +12225,111 @@
                       <a:schemeClr val="bg1"/>
                     </a:solidFill>
                   </a:rPr>
-                  <a:t>Calculate metadata</a:t>
-                </a:r>
-              </a:p>
-              <a:p>
-                <a:pPr marL="342900" indent="-342900">
-                  <a:buFont typeface="Arial" panose="020B0604020202020204" pitchFamily="34" charset="0"/>
-                  <a:buChar char="•"/>
-                </a:pPr>
-                <a:r>
-                  <a:rPr lang="en-US" sz="2400" dirty="0">
-                    <a:solidFill>
-                      <a:schemeClr val="bg1"/>
-                    </a:solidFill>
-                  </a:rPr>
-                  <a:t>Filter data using metadata</a:t>
-                </a:r>
-              </a:p>
-              <a:p>
-                <a:pPr marL="342900" indent="-342900">
-                  <a:buFont typeface="Arial" panose="020B0604020202020204" pitchFamily="34" charset="0"/>
-                  <a:buChar char="•"/>
-                </a:pPr>
-                <a:r>
-                  <a:rPr lang="en-US" sz="2400" dirty="0">
-                    <a:solidFill>
-                      <a:schemeClr val="bg1"/>
-                    </a:solidFill>
-                  </a:rPr>
-                  <a:t>Normalize all data to </a:t>
+                  <a:t> </a:t>
                 </a:r>
                 <a14:m>
                   <m:oMath xmlns:m="http://schemas.openxmlformats.org/officeDocument/2006/math">
-                    <m:sSub>
-                      <m:sSubPr>
+                    <m:f>
+                      <m:fPr>
                         <m:ctrlPr>
-                          <a:rPr lang="en-US" sz="2400" b="0" i="1" dirty="0" smtClean="0">
+                          <a:rPr lang="en-US" sz="2400" i="1" smtClean="0">
                             <a:solidFill>
                               <a:schemeClr val="bg1"/>
                             </a:solidFill>
                             <a:latin typeface="Cambria Math" panose="02040503050406030204" pitchFamily="18" charset="0"/>
                           </a:rPr>
                         </m:ctrlPr>
-                      </m:sSubPr>
-                      <m:e>
-                        <m:r>
-                          <a:rPr lang="en-US" sz="2400" b="0" i="1" dirty="0" smtClean="0">
-                            <a:solidFill>
-                              <a:schemeClr val="bg1"/>
-                            </a:solidFill>
-                            <a:latin typeface="Cambria Math" panose="02040503050406030204" pitchFamily="18" charset="0"/>
-                          </a:rPr>
-                          <m:t>𝑧</m:t>
-                        </m:r>
-                      </m:e>
-                      <m:sub>
-                        <m:r>
-                          <a:rPr lang="en-US" sz="2400" b="0" i="1" dirty="0" smtClean="0">
-                            <a:solidFill>
-                              <a:schemeClr val="bg1"/>
-                            </a:solidFill>
-                            <a:latin typeface="Cambria Math" panose="02040503050406030204" pitchFamily="18" charset="0"/>
-                          </a:rPr>
-                          <m:t>𝑝𝑟𝑜𝑔𝑒𝑛𝑖𝑡𝑜𝑟</m:t>
-                        </m:r>
-                      </m:sub>
-                    </m:sSub>
+                      </m:fPr>
+                      <m:num>
+                        <m:sSup>
+                          <m:sSupPr>
+                            <m:ctrlPr>
+                              <a:rPr lang="en-US" sz="2400" b="0" i="1" smtClean="0">
+                                <a:solidFill>
+                                  <a:schemeClr val="bg1"/>
+                                </a:solidFill>
+                                <a:latin typeface="Cambria Math" panose="02040503050406030204" pitchFamily="18" charset="0"/>
+                              </a:rPr>
+                            </m:ctrlPr>
+                          </m:sSupPr>
+                          <m:e>
+                            <m:r>
+                              <a:rPr lang="en-US" sz="2400" b="0" i="1" smtClean="0">
+                                <a:solidFill>
+                                  <a:schemeClr val="bg1"/>
+                                </a:solidFill>
+                                <a:latin typeface="Cambria Math" panose="02040503050406030204" pitchFamily="18" charset="0"/>
+                              </a:rPr>
+                              <m:t>𝜇</m:t>
+                            </m:r>
+                          </m:e>
+                          <m:sup>
+                            <m:r>
+                              <a:rPr lang="en-US" sz="2400" b="0" i="1" smtClean="0">
+                                <a:solidFill>
+                                  <a:schemeClr val="bg1"/>
+                                </a:solidFill>
+                                <a:latin typeface="Cambria Math" panose="02040503050406030204" pitchFamily="18" charset="0"/>
+                              </a:rPr>
+                              <m:t>2</m:t>
+                            </m:r>
+                          </m:sup>
+                        </m:sSup>
+                      </m:num>
+                      <m:den>
+                        <m:sSup>
+                          <m:sSupPr>
+                            <m:ctrlPr>
+                              <a:rPr lang="en-US" sz="2400" b="0" i="1" smtClean="0">
+                                <a:solidFill>
+                                  <a:schemeClr val="bg1"/>
+                                </a:solidFill>
+                                <a:latin typeface="Cambria Math" panose="02040503050406030204" pitchFamily="18" charset="0"/>
+                              </a:rPr>
+                            </m:ctrlPr>
+                          </m:sSupPr>
+                          <m:e>
+                            <m:r>
+                              <a:rPr lang="en-US" sz="2400" b="0" i="1" smtClean="0">
+                                <a:solidFill>
+                                  <a:schemeClr val="bg1"/>
+                                </a:solidFill>
+                                <a:latin typeface="Cambria Math" panose="02040503050406030204" pitchFamily="18" charset="0"/>
+                              </a:rPr>
+                              <m:t>𝜎</m:t>
+                            </m:r>
+                          </m:e>
+                          <m:sup>
+                            <m:r>
+                              <a:rPr lang="en-US" sz="2400" b="0" i="1" smtClean="0">
+                                <a:solidFill>
+                                  <a:schemeClr val="bg1"/>
+                                </a:solidFill>
+                                <a:latin typeface="Cambria Math" panose="02040503050406030204" pitchFamily="18" charset="0"/>
+                              </a:rPr>
+                              <m:t>2</m:t>
+                            </m:r>
+                          </m:sup>
+                        </m:sSup>
+                      </m:den>
+                    </m:f>
                     <m:r>
-                      <a:rPr lang="en-US" sz="2400" b="0" i="1" smtClean="0">
+                      <a:rPr lang="en-US" sz="2400" b="0" i="0" smtClean="0">
                         <a:solidFill>
                           <a:schemeClr val="bg1"/>
                         </a:solidFill>
                         <a:latin typeface="Cambria Math" panose="02040503050406030204" pitchFamily="18" charset="0"/>
                       </a:rPr>
-                      <m:t>=</m:t>
+                      <m:t>≥</m:t>
                     </m:r>
                     <m:r>
-                      <a:rPr lang="en-US" sz="2400" b="0" i="1" smtClean="0">
+                      <a:rPr lang="en-US" sz="2400" b="0" i="0" smtClean="0">
                         <a:solidFill>
                           <a:schemeClr val="bg1"/>
                         </a:solidFill>
                         <a:latin typeface="Cambria Math" panose="02040503050406030204" pitchFamily="18" charset="0"/>
                       </a:rPr>
-                      <m:t>0</m:t>
+                      <m:t>6</m:t>
                     </m:r>
                   </m:oMath>
                 </a14:m>
@@ -11804,84 +12338,6 @@
                     <a:schemeClr val="bg1"/>
                   </a:solidFill>
                 </a:endParaRPr>
-              </a:p>
-              <a:p>
-                <a:pPr marL="342900" indent="-342900">
-                  <a:buFont typeface="Arial" panose="020B0604020202020204" pitchFamily="34" charset="0"/>
-                  <a:buChar char="•"/>
-                </a:pPr>
-                <a:r>
-                  <a:rPr lang="en-US" sz="2400" dirty="0">
-                    <a:solidFill>
-                      <a:schemeClr val="bg1"/>
-                    </a:solidFill>
-                  </a:rPr>
-                  <a:t>Normalize flux around Si II emission line </a:t>
-                </a:r>
-                <a14:m>
-                  <m:oMath xmlns:m="http://schemas.openxmlformats.org/officeDocument/2006/math">
-                    <m:r>
-                      <a:rPr lang="en-US" sz="2400" b="0" i="1" smtClean="0">
-                        <a:solidFill>
-                          <a:schemeClr val="bg1"/>
-                        </a:solidFill>
-                        <a:latin typeface="Cambria Math" panose="02040503050406030204" pitchFamily="18" charset="0"/>
-                      </a:rPr>
-                      <m:t>≈</m:t>
-                    </m:r>
-                    <m:r>
-                      <a:rPr lang="en-US" sz="2400" b="0" i="1" smtClean="0">
-                        <a:solidFill>
-                          <a:schemeClr val="bg1"/>
-                        </a:solidFill>
-                        <a:latin typeface="Cambria Math" panose="02040503050406030204" pitchFamily="18" charset="0"/>
-                      </a:rPr>
-                      <m:t>6356</m:t>
-                    </m:r>
-                    <m:r>
-                      <a:rPr lang="en-US" sz="2400" b="0" i="1" smtClean="0">
-                        <a:solidFill>
-                          <a:schemeClr val="bg1"/>
-                        </a:solidFill>
-                        <a:latin typeface="Cambria Math" panose="02040503050406030204" pitchFamily="18" charset="0"/>
-                      </a:rPr>
-                      <m:t>Å</m:t>
-                    </m:r>
-                  </m:oMath>
-                </a14:m>
-                <a:endParaRPr lang="en-US" sz="2400" dirty="0">
-                  <a:solidFill>
-                    <a:schemeClr val="bg1"/>
-                  </a:solidFill>
-                </a:endParaRPr>
-              </a:p>
-              <a:p>
-                <a:pPr marL="342900" indent="-342900">
-                  <a:buFont typeface="Arial" panose="020B0604020202020204" pitchFamily="34" charset="0"/>
-                  <a:buChar char="•"/>
-                </a:pPr>
-                <a:r>
-                  <a:rPr lang="en-US" sz="2400" dirty="0">
-                    <a:solidFill>
-                      <a:schemeClr val="bg1"/>
-                    </a:solidFill>
-                  </a:rPr>
-                  <a:t>Find Si II absorption line</a:t>
-                </a:r>
-              </a:p>
-              <a:p>
-                <a:pPr marL="342900" indent="-342900">
-                  <a:buFont typeface="Arial" panose="020B0604020202020204" pitchFamily="34" charset="0"/>
-                  <a:buChar char="•"/>
-                </a:pPr>
-                <a:r>
-                  <a:rPr lang="en-US" sz="2400" dirty="0">
-                    <a:solidFill>
-                      <a:schemeClr val="bg1"/>
-                    </a:solidFill>
-                  </a:rPr>
-                  <a:t>Fit </a:t>
-                </a:r>
               </a:p>
             </p:txBody>
           </p:sp>
@@ -11892,7 +12348,7 @@
               <p:cNvPr id="7" name="TextBox 6">
                 <a:extLst>
                   <a:ext uri="{FF2B5EF4-FFF2-40B4-BE49-F238E27FC236}">
-                    <a16:creationId xmlns:a16="http://schemas.microsoft.com/office/drawing/2014/main" id="{4F7E64C6-24B8-600F-5E6E-61B70329F154}"/>
+                    <a16:creationId xmlns:a16="http://schemas.microsoft.com/office/drawing/2014/main" id="{A2C0AE6B-BEF9-C5AF-A9F4-11C126F2117A}"/>
                   </a:ext>
                 </a:extLst>
               </p:cNvPr>
@@ -11903,16 +12359,16 @@
             </p:nvSpPr>
             <p:spPr>
               <a:xfrm>
-                <a:off x="1981200" y="1590675"/>
-                <a:ext cx="7962900" cy="2726067"/>
+                <a:off x="1457325" y="1377103"/>
+                <a:ext cx="2914650" cy="1037720"/>
               </a:xfrm>
               <a:prstGeom prst="rect">
                 <a:avLst/>
               </a:prstGeom>
               <a:blipFill>
-                <a:blip r:embed="rId2"/>
+                <a:blip r:embed="rId3"/>
                 <a:stretch>
-                  <a:fillRect l="-995" t="-1566" b="-4474"/>
+                  <a:fillRect l="-2720" t="-4118" b="-2941"/>
                 </a:stretch>
               </a:blipFill>
             </p:spPr>
@@ -11931,10 +12387,769 @@
           </p:sp>
         </mc:Fallback>
       </mc:AlternateContent>
+      <mc:AlternateContent xmlns:mc="http://schemas.openxmlformats.org/markup-compatibility/2006" xmlns:a14="http://schemas.microsoft.com/office/drawing/2010/main">
+        <mc:Choice Requires="a14">
+          <p:sp>
+            <p:nvSpPr>
+              <p:cNvPr id="9" name="TextBox 8">
+                <a:extLst>
+                  <a:ext uri="{FF2B5EF4-FFF2-40B4-BE49-F238E27FC236}">
+                    <a16:creationId xmlns:a16="http://schemas.microsoft.com/office/drawing/2014/main" id="{FE417CC2-0A49-D4C4-ACD9-8062E152FBDA}"/>
+                  </a:ext>
+                </a:extLst>
+              </p:cNvPr>
+              <p:cNvSpPr txBox="1"/>
+              <p:nvPr/>
+            </p:nvSpPr>
+            <p:spPr>
+              <a:xfrm>
+                <a:off x="4371975" y="1377103"/>
+                <a:ext cx="6096000" cy="849335"/>
+              </a:xfrm>
+              <a:prstGeom prst="rect">
+                <a:avLst/>
+              </a:prstGeom>
+              <a:noFill/>
+            </p:spPr>
+            <p:txBody>
+              <a:bodyPr wrap="square">
+                <a:spAutoFit/>
+              </a:bodyPr>
+              <a:lstStyle/>
+              <a:p>
+                <a:pPr marL="342900" indent="-342900">
+                  <a:buFont typeface="Arial" panose="020B0604020202020204" pitchFamily="34" charset="0"/>
+                  <a:buChar char="•"/>
+                </a:pPr>
+                <a:r>
+                  <a:rPr lang="en-US" sz="2400" dirty="0">
+                    <a:solidFill>
+                      <a:schemeClr val="bg1"/>
+                    </a:solidFill>
+                  </a:rPr>
+                  <a:t>Mean Spectral Resolution</a:t>
+                </a:r>
+              </a:p>
+              <a:p>
+                <a:pPr marL="800100" lvl="1" indent="-342900">
+                  <a:buFont typeface="Arial" panose="020B0604020202020204" pitchFamily="34" charset="0"/>
+                  <a:buChar char="•"/>
+                </a:pPr>
+                <a14:m>
+                  <m:oMath xmlns:m="http://schemas.openxmlformats.org/officeDocument/2006/math">
+                    <m:r>
+                      <a:rPr lang="en-US" sz="2400" b="0" i="1" smtClean="0">
+                        <a:solidFill>
+                          <a:schemeClr val="bg1"/>
+                        </a:solidFill>
+                        <a:latin typeface="Cambria Math" panose="02040503050406030204" pitchFamily="18" charset="0"/>
+                      </a:rPr>
+                      <m:t>𝑅</m:t>
+                    </m:r>
+                    <m:r>
+                      <a:rPr lang="en-US" sz="2400" b="0" i="1" smtClean="0">
+                        <a:solidFill>
+                          <a:schemeClr val="bg1"/>
+                        </a:solidFill>
+                        <a:latin typeface="Cambria Math" panose="02040503050406030204" pitchFamily="18" charset="0"/>
+                      </a:rPr>
+                      <m:t>&lt;5Å</m:t>
+                    </m:r>
+                  </m:oMath>
+                </a14:m>
+                <a:endParaRPr lang="en-US" sz="2400" dirty="0">
+                  <a:solidFill>
+                    <a:schemeClr val="bg1"/>
+                  </a:solidFill>
+                </a:endParaRPr>
+              </a:p>
+            </p:txBody>
+          </p:sp>
+        </mc:Choice>
+        <mc:Fallback xmlns="">
+          <p:sp>
+            <p:nvSpPr>
+              <p:cNvPr id="9" name="TextBox 8">
+                <a:extLst>
+                  <a:ext uri="{FF2B5EF4-FFF2-40B4-BE49-F238E27FC236}">
+                    <a16:creationId xmlns:a16="http://schemas.microsoft.com/office/drawing/2014/main" id="{FE417CC2-0A49-D4C4-ACD9-8062E152FBDA}"/>
+                  </a:ext>
+                </a:extLst>
+              </p:cNvPr>
+              <p:cNvSpPr txBox="1">
+                <a:spLocks noRot="1" noChangeAspect="1" noMove="1" noResize="1" noEditPoints="1" noAdjustHandles="1" noChangeArrowheads="1" noChangeShapeType="1" noTextEdit="1"/>
+              </p:cNvSpPr>
+              <p:nvPr/>
+            </p:nvSpPr>
+            <p:spPr>
+              <a:xfrm>
+                <a:off x="4371975" y="1377103"/>
+                <a:ext cx="6096000" cy="849335"/>
+              </a:xfrm>
+              <a:prstGeom prst="rect">
+                <a:avLst/>
+              </a:prstGeom>
+              <a:blipFill>
+                <a:blip r:embed="rId4"/>
+                <a:stretch>
+                  <a:fillRect l="-1300" t="-5036" b="-13669"/>
+                </a:stretch>
+              </a:blipFill>
+            </p:spPr>
+            <p:txBody>
+              <a:bodyPr/>
+              <a:lstStyle/>
+              <a:p>
+                <a:r>
+                  <a:rPr lang="en-US">
+                    <a:noFill/>
+                  </a:rPr>
+                  <a:t> </a:t>
+                </a:r>
+              </a:p>
+            </p:txBody>
+          </p:sp>
+        </mc:Fallback>
+      </mc:AlternateContent>
+      <p:pic>
+        <p:nvPicPr>
+          <p:cNvPr id="22" name="Picture 21">
+            <a:extLst>
+              <a:ext uri="{FF2B5EF4-FFF2-40B4-BE49-F238E27FC236}">
+                <a16:creationId xmlns:a16="http://schemas.microsoft.com/office/drawing/2014/main" id="{14E7184D-E00E-B3DC-7B11-EFDF0F3547F0}"/>
+              </a:ext>
+            </a:extLst>
+          </p:cNvPr>
+          <p:cNvPicPr>
+            <a:picLocks noChangeAspect="1"/>
+          </p:cNvPicPr>
+          <p:nvPr/>
+        </p:nvPicPr>
+        <p:blipFill>
+          <a:blip r:embed="rId5"/>
+          <a:srcRect l="8325" t="6176" r="8857" b="3284"/>
+          <a:stretch>
+            <a:fillRect/>
+          </a:stretch>
+        </p:blipFill>
+        <p:spPr>
+          <a:xfrm>
+            <a:off x="1025534" y="2514654"/>
+            <a:ext cx="10140931" cy="4157427"/>
+          </a:xfrm>
+          <a:prstGeom prst="roundRect">
+            <a:avLst>
+              <a:gd name="adj" fmla="val 901"/>
+            </a:avLst>
+          </a:prstGeom>
+        </p:spPr>
+      </p:pic>
     </p:spTree>
     <p:extLst>
       <p:ext uri="{BB962C8B-B14F-4D97-AF65-F5344CB8AC3E}">
-        <p14:creationId xmlns:p14="http://schemas.microsoft.com/office/powerpoint/2010/main" val="3099713292"/>
+        <p14:creationId xmlns:p14="http://schemas.microsoft.com/office/powerpoint/2010/main" val="3964829436"/>
+      </p:ext>
+    </p:extLst>
+  </p:cSld>
+  <p:clrMapOvr>
+    <a:masterClrMapping/>
+  </p:clrMapOvr>
+</p:sld>
+</file>
+
+<file path=ppt/slides/slide7.xml><?xml version="1.0" encoding="utf-8"?>
+<p:sld xmlns:a="http://schemas.openxmlformats.org/drawingml/2006/main" xmlns:r="http://schemas.openxmlformats.org/officeDocument/2006/relationships" xmlns:p="http://schemas.openxmlformats.org/presentationml/2006/main">
+  <p:cSld>
+    <p:spTree>
+      <p:nvGrpSpPr>
+        <p:cNvPr id="1" name="">
+          <a:extLst>
+            <a:ext uri="{FF2B5EF4-FFF2-40B4-BE49-F238E27FC236}">
+              <a16:creationId xmlns:a16="http://schemas.microsoft.com/office/drawing/2014/main" id="{46BF9AC1-0830-1903-3025-079B19F94CB5}"/>
+            </a:ext>
+          </a:extLst>
+        </p:cNvPr>
+        <p:cNvGrpSpPr/>
+        <p:nvPr/>
+      </p:nvGrpSpPr>
+      <p:grpSpPr>
+        <a:xfrm>
+          <a:off x="0" y="0"/>
+          <a:ext cx="0" cy="0"/>
+          <a:chOff x="0" y="0"/>
+          <a:chExt cx="0" cy="0"/>
+        </a:xfrm>
+      </p:grpSpPr>
+      <p:sp>
+        <p:nvSpPr>
+          <p:cNvPr id="2" name="TextBox 1">
+            <a:extLst>
+              <a:ext uri="{FF2B5EF4-FFF2-40B4-BE49-F238E27FC236}">
+                <a16:creationId xmlns:a16="http://schemas.microsoft.com/office/drawing/2014/main" id="{BA804D03-3F03-72B7-8E78-9054D31244F7}"/>
+              </a:ext>
+            </a:extLst>
+          </p:cNvPr>
+          <p:cNvSpPr txBox="1"/>
+          <p:nvPr/>
+        </p:nvSpPr>
+        <p:spPr>
+          <a:xfrm>
+            <a:off x="4280460" y="413658"/>
+            <a:ext cx="3631123" cy="707886"/>
+          </a:xfrm>
+          <a:prstGeom prst="rect">
+            <a:avLst/>
+          </a:prstGeom>
+          <a:noFill/>
+        </p:spPr>
+        <p:txBody>
+          <a:bodyPr wrap="none" rtlCol="0">
+            <a:spAutoFit/>
+          </a:bodyPr>
+          <a:lstStyle/>
+          <a:p>
+            <a:pPr algn="ctr"/>
+            <a:r>
+              <a:rPr lang="en-US" sz="4000" b="1" dirty="0">
+                <a:solidFill>
+                  <a:schemeClr val="bg1"/>
+                </a:solidFill>
+              </a:rPr>
+              <a:t>Preprocessing</a:t>
+            </a:r>
+          </a:p>
+        </p:txBody>
+      </p:sp>
+      <p:sp>
+        <p:nvSpPr>
+          <p:cNvPr id="3" name="TextBox 2">
+            <a:extLst>
+              <a:ext uri="{FF2B5EF4-FFF2-40B4-BE49-F238E27FC236}">
+                <a16:creationId xmlns:a16="http://schemas.microsoft.com/office/drawing/2014/main" id="{087987EA-D109-5001-91DC-798AB16E9A1E}"/>
+              </a:ext>
+            </a:extLst>
+          </p:cNvPr>
+          <p:cNvSpPr txBox="1"/>
+          <p:nvPr/>
+        </p:nvSpPr>
+        <p:spPr>
+          <a:xfrm>
+            <a:off x="1981200" y="1590675"/>
+            <a:ext cx="7962900" cy="1569660"/>
+          </a:xfrm>
+          <a:prstGeom prst="rect">
+            <a:avLst/>
+          </a:prstGeom>
+          <a:noFill/>
+        </p:spPr>
+        <p:txBody>
+          <a:bodyPr wrap="square" rtlCol="0">
+            <a:spAutoFit/>
+          </a:bodyPr>
+          <a:lstStyle/>
+          <a:p>
+            <a:pPr marL="342900" indent="-342900">
+              <a:buFont typeface="Arial" panose="020B0604020202020204" pitchFamily="34" charset="0"/>
+              <a:buChar char="•"/>
+            </a:pPr>
+            <a:r>
+              <a:rPr lang="en-US" sz="2400" dirty="0">
+                <a:solidFill>
+                  <a:schemeClr val="bg1"/>
+                </a:solidFill>
+              </a:rPr>
+              <a:t>Redshift normalization</a:t>
+            </a:r>
+          </a:p>
+          <a:p>
+            <a:pPr marL="800100" lvl="1" indent="-342900">
+              <a:buFont typeface="Arial" panose="020B0604020202020204" pitchFamily="34" charset="0"/>
+              <a:buChar char="•"/>
+            </a:pPr>
+            <a:r>
+              <a:rPr lang="en-US" sz="2400" dirty="0">
+                <a:solidFill>
+                  <a:schemeClr val="bg1"/>
+                </a:solidFill>
+              </a:rPr>
+              <a:t>Since I am looking at ejecta velocity, I need to change my data to be in the reference frame of the object</a:t>
+            </a:r>
+          </a:p>
+        </p:txBody>
+      </p:sp>
+    </p:spTree>
+    <p:extLst>
+      <p:ext uri="{BB962C8B-B14F-4D97-AF65-F5344CB8AC3E}">
+        <p14:creationId xmlns:p14="http://schemas.microsoft.com/office/powerpoint/2010/main" val="1554511349"/>
+      </p:ext>
+    </p:extLst>
+  </p:cSld>
+  <p:clrMapOvr>
+    <a:masterClrMapping/>
+  </p:clrMapOvr>
+</p:sld>
+</file>
+
+<file path=ppt/slides/slide8.xml><?xml version="1.0" encoding="utf-8"?>
+<p:sld xmlns:a="http://schemas.openxmlformats.org/drawingml/2006/main" xmlns:r="http://schemas.openxmlformats.org/officeDocument/2006/relationships" xmlns:p="http://schemas.openxmlformats.org/presentationml/2006/main">
+  <p:cSld>
+    <p:spTree>
+      <p:nvGrpSpPr>
+        <p:cNvPr id="1" name="">
+          <a:extLst>
+            <a:ext uri="{FF2B5EF4-FFF2-40B4-BE49-F238E27FC236}">
+              <a16:creationId xmlns:a16="http://schemas.microsoft.com/office/drawing/2014/main" id="{5A694B21-DE40-4337-C7CA-56D3F8F34737}"/>
+            </a:ext>
+          </a:extLst>
+        </p:cNvPr>
+        <p:cNvGrpSpPr/>
+        <p:nvPr/>
+      </p:nvGrpSpPr>
+      <p:grpSpPr>
+        <a:xfrm>
+          <a:off x="0" y="0"/>
+          <a:ext cx="0" cy="0"/>
+          <a:chOff x="0" y="0"/>
+          <a:chExt cx="0" cy="0"/>
+        </a:xfrm>
+      </p:grpSpPr>
+      <p:pic>
+        <p:nvPicPr>
+          <p:cNvPr id="17" name="Picture 16">
+            <a:extLst>
+              <a:ext uri="{FF2B5EF4-FFF2-40B4-BE49-F238E27FC236}">
+                <a16:creationId xmlns:a16="http://schemas.microsoft.com/office/drawing/2014/main" id="{900EB58E-EBE2-3EEB-35C0-B7F2EB7F16E9}"/>
+              </a:ext>
+            </a:extLst>
+          </p:cNvPr>
+          <p:cNvPicPr>
+            <a:picLocks noChangeAspect="1"/>
+          </p:cNvPicPr>
+          <p:nvPr/>
+        </p:nvPicPr>
+        <p:blipFill>
+          <a:blip r:embed="rId2"/>
+          <a:srcRect l="10021" t="5240" r="9084" b="4140"/>
+          <a:stretch>
+            <a:fillRect/>
+          </a:stretch>
+        </p:blipFill>
+        <p:spPr>
+          <a:xfrm>
+            <a:off x="680309" y="2775858"/>
+            <a:ext cx="9076012" cy="3812722"/>
+          </a:xfrm>
+          <a:prstGeom prst="roundRect">
+            <a:avLst>
+              <a:gd name="adj" fmla="val 1095"/>
+            </a:avLst>
+          </a:prstGeom>
+        </p:spPr>
+      </p:pic>
+      <p:sp>
+        <p:nvSpPr>
+          <p:cNvPr id="2" name="TextBox 1">
+            <a:extLst>
+              <a:ext uri="{FF2B5EF4-FFF2-40B4-BE49-F238E27FC236}">
+                <a16:creationId xmlns:a16="http://schemas.microsoft.com/office/drawing/2014/main" id="{7101E6E8-52ED-FCEF-6736-49A7F5DCB5D3}"/>
+              </a:ext>
+            </a:extLst>
+          </p:cNvPr>
+          <p:cNvSpPr txBox="1"/>
+          <p:nvPr/>
+        </p:nvSpPr>
+        <p:spPr>
+          <a:xfrm>
+            <a:off x="4280460" y="413658"/>
+            <a:ext cx="3631123" cy="707886"/>
+          </a:xfrm>
+          <a:prstGeom prst="rect">
+            <a:avLst/>
+          </a:prstGeom>
+          <a:noFill/>
+        </p:spPr>
+        <p:txBody>
+          <a:bodyPr wrap="none" rtlCol="0">
+            <a:spAutoFit/>
+          </a:bodyPr>
+          <a:lstStyle/>
+          <a:p>
+            <a:pPr algn="ctr"/>
+            <a:r>
+              <a:rPr lang="en-US" sz="4000" b="1" dirty="0">
+                <a:solidFill>
+                  <a:schemeClr val="bg1"/>
+                </a:solidFill>
+              </a:rPr>
+              <a:t>Preprocessing</a:t>
+            </a:r>
+          </a:p>
+        </p:txBody>
+      </p:sp>
+      <p:sp>
+        <p:nvSpPr>
+          <p:cNvPr id="3" name="TextBox 2">
+            <a:extLst>
+              <a:ext uri="{FF2B5EF4-FFF2-40B4-BE49-F238E27FC236}">
+                <a16:creationId xmlns:a16="http://schemas.microsoft.com/office/drawing/2014/main" id="{10145742-14EE-EEC8-E092-E35E6E6A2B7F}"/>
+              </a:ext>
+            </a:extLst>
+          </p:cNvPr>
+          <p:cNvSpPr txBox="1"/>
+          <p:nvPr/>
+        </p:nvSpPr>
+        <p:spPr>
+          <a:xfrm>
+            <a:off x="1378702" y="1030665"/>
+            <a:ext cx="9346447" cy="1200329"/>
+          </a:xfrm>
+          <a:prstGeom prst="rect">
+            <a:avLst/>
+          </a:prstGeom>
+          <a:noFill/>
+        </p:spPr>
+        <p:txBody>
+          <a:bodyPr wrap="square" rtlCol="0">
+            <a:spAutoFit/>
+          </a:bodyPr>
+          <a:lstStyle/>
+          <a:p>
+            <a:pPr marL="342900" indent="-342900">
+              <a:buFont typeface="Arial" panose="020B0604020202020204" pitchFamily="34" charset="0"/>
+              <a:buChar char="•"/>
+            </a:pPr>
+            <a:r>
+              <a:rPr lang="en-US" sz="2400" dirty="0">
+                <a:solidFill>
+                  <a:schemeClr val="bg1"/>
+                </a:solidFill>
+              </a:rPr>
+              <a:t>Smooth data using gaussian filter</a:t>
+            </a:r>
+          </a:p>
+          <a:p>
+            <a:pPr marL="800100" lvl="1" indent="-342900">
+              <a:buFont typeface="Arial" panose="020B0604020202020204" pitchFamily="34" charset="0"/>
+              <a:buChar char="•"/>
+            </a:pPr>
+            <a:r>
+              <a:rPr lang="en-US" sz="2400" dirty="0">
+                <a:solidFill>
+                  <a:schemeClr val="bg1"/>
+                </a:solidFill>
+              </a:rPr>
+              <a:t>gaussian is a low-pass filter</a:t>
+            </a:r>
+          </a:p>
+          <a:p>
+            <a:pPr marL="800100" lvl="1" indent="-342900">
+              <a:buFont typeface="Arial" panose="020B0604020202020204" pitchFamily="34" charset="0"/>
+              <a:buChar char="•"/>
+            </a:pPr>
+            <a:r>
+              <a:rPr lang="en-US" sz="2400" dirty="0">
+                <a:solidFill>
+                  <a:schemeClr val="bg1"/>
+                </a:solidFill>
+              </a:rPr>
+              <a:t>In effect, removes much of the noise</a:t>
+            </a:r>
+          </a:p>
+        </p:txBody>
+      </p:sp>
+      <p:pic>
+        <p:nvPicPr>
+          <p:cNvPr id="9" name="Picture 8" descr="A collage of a person in a hot air balloon">
+            <a:extLst>
+              <a:ext uri="{FF2B5EF4-FFF2-40B4-BE49-F238E27FC236}">
+                <a16:creationId xmlns:a16="http://schemas.microsoft.com/office/drawing/2014/main" id="{E237C0A4-26B3-EC10-475C-D9DD10A7CA6B}"/>
+              </a:ext>
+            </a:extLst>
+          </p:cNvPr>
+          <p:cNvPicPr>
+            <a:picLocks noChangeAspect="1"/>
+          </p:cNvPicPr>
+          <p:nvPr/>
+        </p:nvPicPr>
+        <p:blipFill>
+          <a:blip r:embed="rId3"/>
+          <a:srcRect b="67093"/>
+          <a:stretch>
+            <a:fillRect/>
+          </a:stretch>
+        </p:blipFill>
+        <p:spPr>
+          <a:xfrm>
+            <a:off x="9839325" y="3628163"/>
+            <a:ext cx="2247900" cy="1477486"/>
+          </a:xfrm>
+          <a:prstGeom prst="rect">
+            <a:avLst/>
+          </a:prstGeom>
+        </p:spPr>
+      </p:pic>
+      <p:pic>
+        <p:nvPicPr>
+          <p:cNvPr id="11" name="Picture 10" descr="A collage of a person in a hot air balloon&#10;&#10;AI-generated content may be incorrect.">
+            <a:extLst>
+              <a:ext uri="{FF2B5EF4-FFF2-40B4-BE49-F238E27FC236}">
+                <a16:creationId xmlns:a16="http://schemas.microsoft.com/office/drawing/2014/main" id="{EEF24E58-884B-6988-A984-CB59ABBA648F}"/>
+              </a:ext>
+            </a:extLst>
+          </p:cNvPr>
+          <p:cNvPicPr>
+            <a:picLocks noChangeAspect="1"/>
+          </p:cNvPicPr>
+          <p:nvPr/>
+        </p:nvPicPr>
+        <p:blipFill>
+          <a:blip r:embed="rId3"/>
+          <a:srcRect t="67075"/>
+          <a:stretch>
+            <a:fillRect/>
+          </a:stretch>
+        </p:blipFill>
+        <p:spPr>
+          <a:xfrm>
+            <a:off x="9838114" y="5105649"/>
+            <a:ext cx="2246689" cy="1477487"/>
+          </a:xfrm>
+          <a:prstGeom prst="rect">
+            <a:avLst/>
+          </a:prstGeom>
+        </p:spPr>
+      </p:pic>
+      <p:sp>
+        <p:nvSpPr>
+          <p:cNvPr id="12" name="TextBox 11">
+            <a:extLst>
+              <a:ext uri="{FF2B5EF4-FFF2-40B4-BE49-F238E27FC236}">
+                <a16:creationId xmlns:a16="http://schemas.microsoft.com/office/drawing/2014/main" id="{B95ED447-5B14-945C-A012-B648D43ACB41}"/>
+              </a:ext>
+            </a:extLst>
+          </p:cNvPr>
+          <p:cNvSpPr txBox="1"/>
+          <p:nvPr/>
+        </p:nvSpPr>
+        <p:spPr>
+          <a:xfrm>
+            <a:off x="9866689" y="3723413"/>
+            <a:ext cx="1645002" cy="200055"/>
+          </a:xfrm>
+          <a:prstGeom prst="rect">
+            <a:avLst/>
+          </a:prstGeom>
+          <a:noFill/>
+        </p:spPr>
+        <p:txBody>
+          <a:bodyPr wrap="none" rtlCol="0">
+            <a:spAutoFit/>
+          </a:bodyPr>
+          <a:lstStyle/>
+          <a:p>
+            <a:r>
+              <a:rPr lang="en-US" sz="700" dirty="0">
+                <a:solidFill>
+                  <a:schemeClr val="bg1"/>
+                </a:solidFill>
+              </a:rPr>
+              <a:t>Credit: IkamusumeFan (Wikipedia)</a:t>
+            </a:r>
+          </a:p>
+        </p:txBody>
+      </p:sp>
+    </p:spTree>
+    <p:extLst>
+      <p:ext uri="{BB962C8B-B14F-4D97-AF65-F5344CB8AC3E}">
+        <p14:creationId xmlns:p14="http://schemas.microsoft.com/office/powerpoint/2010/main" val="3687152425"/>
+      </p:ext>
+    </p:extLst>
+  </p:cSld>
+  <p:clrMapOvr>
+    <a:masterClrMapping/>
+  </p:clrMapOvr>
+</p:sld>
+</file>
+
+<file path=ppt/slides/slide9.xml><?xml version="1.0" encoding="utf-8"?>
+<p:sld xmlns:a="http://schemas.openxmlformats.org/drawingml/2006/main" xmlns:r="http://schemas.openxmlformats.org/officeDocument/2006/relationships" xmlns:p="http://schemas.openxmlformats.org/presentationml/2006/main">
+  <p:cSld>
+    <p:spTree>
+      <p:nvGrpSpPr>
+        <p:cNvPr id="1" name=""/>
+        <p:cNvGrpSpPr/>
+        <p:nvPr/>
+      </p:nvGrpSpPr>
+      <p:grpSpPr>
+        <a:xfrm>
+          <a:off x="0" y="0"/>
+          <a:ext cx="0" cy="0"/>
+          <a:chOff x="0" y="0"/>
+          <a:chExt cx="0" cy="0"/>
+        </a:xfrm>
+      </p:grpSpPr>
+      <p:sp>
+        <p:nvSpPr>
+          <p:cNvPr id="4" name="TextBox 3">
+            <a:extLst>
+              <a:ext uri="{FF2B5EF4-FFF2-40B4-BE49-F238E27FC236}">
+                <a16:creationId xmlns:a16="http://schemas.microsoft.com/office/drawing/2014/main" id="{691CA070-78DA-95DA-0FA1-31CE41DBB74D}"/>
+              </a:ext>
+            </a:extLst>
+          </p:cNvPr>
+          <p:cNvSpPr txBox="1"/>
+          <p:nvPr/>
+        </p:nvSpPr>
+        <p:spPr>
+          <a:xfrm>
+            <a:off x="3567102" y="327933"/>
+            <a:ext cx="5057795" cy="707886"/>
+          </a:xfrm>
+          <a:prstGeom prst="rect">
+            <a:avLst/>
+          </a:prstGeom>
+          <a:noFill/>
+        </p:spPr>
+        <p:txBody>
+          <a:bodyPr wrap="none" rtlCol="0">
+            <a:spAutoFit/>
+          </a:bodyPr>
+          <a:lstStyle/>
+          <a:p>
+            <a:pPr algn="ctr"/>
+            <a:r>
+              <a:rPr lang="en-US" sz="4000" b="1" dirty="0">
+                <a:solidFill>
+                  <a:schemeClr val="bg1"/>
+                </a:solidFill>
+              </a:rPr>
+              <a:t>Calculating Velocity</a:t>
+            </a:r>
+          </a:p>
+        </p:txBody>
+      </p:sp>
+      <p:sp>
+        <p:nvSpPr>
+          <p:cNvPr id="5" name="TextBox 4">
+            <a:extLst>
+              <a:ext uri="{FF2B5EF4-FFF2-40B4-BE49-F238E27FC236}">
+                <a16:creationId xmlns:a16="http://schemas.microsoft.com/office/drawing/2014/main" id="{804A573F-C5B7-052F-322A-91CA7995BD91}"/>
+              </a:ext>
+            </a:extLst>
+          </p:cNvPr>
+          <p:cNvSpPr txBox="1"/>
+          <p:nvPr/>
+        </p:nvSpPr>
+        <p:spPr>
+          <a:xfrm>
+            <a:off x="1581149" y="1381125"/>
+            <a:ext cx="8607880" cy="2308324"/>
+          </a:xfrm>
+          <a:prstGeom prst="rect">
+            <a:avLst/>
+          </a:prstGeom>
+          <a:noFill/>
+        </p:spPr>
+        <p:txBody>
+          <a:bodyPr wrap="square" rtlCol="0">
+            <a:spAutoFit/>
+          </a:bodyPr>
+          <a:lstStyle/>
+          <a:p>
+            <a:pPr marL="342900" indent="-342900">
+              <a:buFont typeface="Arial" panose="020B0604020202020204" pitchFamily="34" charset="0"/>
+              <a:buChar char="•"/>
+            </a:pPr>
+            <a:r>
+              <a:rPr lang="en-US" sz="2400" dirty="0">
+                <a:solidFill>
+                  <a:schemeClr val="bg1"/>
+                </a:solidFill>
+              </a:rPr>
+              <a:t>Took simple approach</a:t>
+            </a:r>
+          </a:p>
+          <a:p>
+            <a:pPr marL="800100" lvl="1" indent="-342900">
+              <a:buFont typeface="Arial" panose="020B0604020202020204" pitchFamily="34" charset="0"/>
+              <a:buChar char="•"/>
+            </a:pPr>
+            <a:r>
+              <a:rPr lang="en-US" sz="2400" dirty="0">
+                <a:solidFill>
+                  <a:schemeClr val="bg1"/>
+                </a:solidFill>
+              </a:rPr>
+              <a:t>Assume given redshift is correct</a:t>
+            </a:r>
+          </a:p>
+          <a:p>
+            <a:pPr marL="800100" lvl="1" indent="-342900">
+              <a:buFont typeface="Arial" panose="020B0604020202020204" pitchFamily="34" charset="0"/>
+              <a:buChar char="•"/>
+            </a:pPr>
+            <a:r>
+              <a:rPr lang="en-US" sz="2400" dirty="0">
+                <a:solidFill>
+                  <a:schemeClr val="bg1"/>
+                </a:solidFill>
+              </a:rPr>
+              <a:t>Find relative minima of the smoothed spectrum</a:t>
+            </a:r>
+          </a:p>
+          <a:p>
+            <a:pPr marL="800100" lvl="1" indent="-342900">
+              <a:buFont typeface="Arial" panose="020B0604020202020204" pitchFamily="34" charset="0"/>
+              <a:buChar char="•"/>
+            </a:pPr>
+            <a:r>
+              <a:rPr lang="en-US" sz="2400" dirty="0">
+                <a:solidFill>
+                  <a:schemeClr val="bg1"/>
+                </a:solidFill>
+              </a:rPr>
+              <a:t>Due to the process of a supernova, the first minima below the Si II emission line should be the equivalent Si II absorption line</a:t>
+            </a:r>
+          </a:p>
+        </p:txBody>
+      </p:sp>
+      <p:pic>
+        <p:nvPicPr>
+          <p:cNvPr id="3" name="Picture 2" descr="A graph with a red line&#10;&#10;AI-generated content may be incorrect.">
+            <a:extLst>
+              <a:ext uri="{FF2B5EF4-FFF2-40B4-BE49-F238E27FC236}">
+                <a16:creationId xmlns:a16="http://schemas.microsoft.com/office/drawing/2014/main" id="{B3B2DC40-94B0-B8AF-5969-17AABF3C4647}"/>
+              </a:ext>
+            </a:extLst>
+          </p:cNvPr>
+          <p:cNvPicPr>
+            <a:picLocks noChangeAspect="1"/>
+          </p:cNvPicPr>
+          <p:nvPr/>
+        </p:nvPicPr>
+        <p:blipFill>
+          <a:blip r:embed="rId2"/>
+          <a:srcRect l="5626" t="7528" r="8151" b="5598"/>
+          <a:stretch>
+            <a:fillRect/>
+          </a:stretch>
+        </p:blipFill>
+        <p:spPr>
+          <a:xfrm>
+            <a:off x="7674428" y="3429000"/>
+            <a:ext cx="3894364" cy="2942829"/>
+          </a:xfrm>
+          <a:prstGeom prst="roundRect">
+            <a:avLst>
+              <a:gd name="adj" fmla="val 1131"/>
+            </a:avLst>
+          </a:prstGeom>
+        </p:spPr>
+      </p:pic>
+    </p:spTree>
+    <p:extLst>
+      <p:ext uri="{BB962C8B-B14F-4D97-AF65-F5344CB8AC3E}">
+        <p14:creationId xmlns:p14="http://schemas.microsoft.com/office/powerpoint/2010/main" val="1817607304"/>
       </p:ext>
     </p:extLst>
   </p:cSld>
@@ -12736,35 +13951,6 @@
 </file>
 
 <file path=customXml/item1.xml><?xml version="1.0" encoding="utf-8"?>
-<p:properties xmlns:p="http://schemas.microsoft.com/office/2006/metadata/properties" xmlns:xsi="http://www.w3.org/2001/XMLSchema-instance" xmlns:pc="http://schemas.microsoft.com/office/infopath/2007/PartnerControls">
-  <documentManagement>
-    <_ip_UnifiedCompliancePolicyUIAction xmlns="http://schemas.microsoft.com/sharepoint/v3" xsi:nil="true"/>
-    <Image xmlns="71af3243-3dd4-4a8d-8c0d-dd76da1f02a5">
-      <Url xsi:nil="true"/>
-      <Description xsi:nil="true"/>
-    </Image>
-    <Status xmlns="71af3243-3dd4-4a8d-8c0d-dd76da1f02a5">Not started</Status>
-    <Background xmlns="71af3243-3dd4-4a8d-8c0d-dd76da1f02a5">false</Background>
-    <_ip_UnifiedCompliancePolicyProperties xmlns="http://schemas.microsoft.com/sharepoint/v3" xsi:nil="true"/>
-    <ImageTagsTaxHTField xmlns="71af3243-3dd4-4a8d-8c0d-dd76da1f02a5">
-      <Terms xmlns="http://schemas.microsoft.com/office/infopath/2007/PartnerControls"/>
-    </ImageTagsTaxHTField>
-    <TaxCatchAll xmlns="230e9df3-be65-4c73-a93b-d1236ebd677e" xsi:nil="true"/>
-    <MediaServiceKeyPoints xmlns="71af3243-3dd4-4a8d-8c0d-dd76da1f02a5" xsi:nil="true"/>
-  </documentManagement>
-</p:properties>
-</file>
-
-<file path=customXml/item2.xml><?xml version="1.0" encoding="utf-8"?>
-<?mso-contentType ?>
-<FormTemplates xmlns="http://schemas.microsoft.com/sharepoint/v3/contenttype/forms">
-  <Display>DocumentLibraryForm</Display>
-  <Edit>DocumentLibraryForm</Edit>
-  <New>DocumentLibraryForm</New>
-</FormTemplates>
-</file>
-
-<file path=customXml/item3.xml><?xml version="1.0" encoding="utf-8"?>
 <ct:contentTypeSchema xmlns:ct="http://schemas.microsoft.com/office/2006/metadata/contentType" xmlns:ma="http://schemas.microsoft.com/office/2006/metadata/properties/metaAttributes" ct:_="" ma:_="" ma:contentTypeName="Document" ma:contentTypeID="0x01010079F111ED35F8CC479449609E8A0923A6" ma:contentTypeVersion="28" ma:contentTypeDescription="Create a new document." ma:contentTypeScope="" ma:versionID="60f5a4f2d2b0abadcf532d48ebf9cb71">
   <xsd:schema xmlns:xsd="http://www.w3.org/2001/XMLSchema" xmlns:xs="http://www.w3.org/2001/XMLSchema" xmlns:p="http://schemas.microsoft.com/office/2006/metadata/properties" xmlns:ns1="http://schemas.microsoft.com/sharepoint/v3" xmlns:ns2="71af3243-3dd4-4a8d-8c0d-dd76da1f02a5" xmlns:ns3="16c05727-aa75-4e4a-9b5f-8a80a1165891" xmlns:ns4="230e9df3-be65-4c73-a93b-d1236ebd677e" targetNamespace="http://schemas.microsoft.com/office/2006/metadata/properties" ma:root="true" ma:fieldsID="7dd78129e6a1811f84807ad11c651531" ns1:_="" ns2:_="" ns3:_="" ns4:_="">
     <xsd:import namespace="http://schemas.microsoft.com/sharepoint/v3"/>
@@ -13076,27 +14262,36 @@
 </ct:contentTypeSchema>
 </file>
 
-<file path=customXml/itemProps1.xml><?xml version="1.0" encoding="utf-8"?>
-<ds:datastoreItem xmlns:ds="http://schemas.openxmlformats.org/officeDocument/2006/customXml" ds:itemID="{80E87F72-70BF-43BC-A0D4-53665DC12672}">
-  <ds:schemaRefs>
-    <ds:schemaRef ds:uri="http://schemas.microsoft.com/office/2006/metadata/properties"/>
-    <ds:schemaRef ds:uri="http://schemas.microsoft.com/office/infopath/2007/PartnerControls"/>
-    <ds:schemaRef ds:uri="http://schemas.microsoft.com/sharepoint/v3"/>
-    <ds:schemaRef ds:uri="71af3243-3dd4-4a8d-8c0d-dd76da1f02a5"/>
-    <ds:schemaRef ds:uri="230e9df3-be65-4c73-a93b-d1236ebd677e"/>
-  </ds:schemaRefs>
-</ds:datastoreItem>
+<file path=customXml/item2.xml><?xml version="1.0" encoding="utf-8"?>
+<p:properties xmlns:p="http://schemas.microsoft.com/office/2006/metadata/properties" xmlns:xsi="http://www.w3.org/2001/XMLSchema-instance" xmlns:pc="http://schemas.microsoft.com/office/infopath/2007/PartnerControls">
+  <documentManagement>
+    <_ip_UnifiedCompliancePolicyUIAction xmlns="http://schemas.microsoft.com/sharepoint/v3" xsi:nil="true"/>
+    <Image xmlns="71af3243-3dd4-4a8d-8c0d-dd76da1f02a5">
+      <Url xsi:nil="true"/>
+      <Description xsi:nil="true"/>
+    </Image>
+    <Status xmlns="71af3243-3dd4-4a8d-8c0d-dd76da1f02a5">Not started</Status>
+    <Background xmlns="71af3243-3dd4-4a8d-8c0d-dd76da1f02a5">false</Background>
+    <_ip_UnifiedCompliancePolicyProperties xmlns="http://schemas.microsoft.com/sharepoint/v3" xsi:nil="true"/>
+    <ImageTagsTaxHTField xmlns="71af3243-3dd4-4a8d-8c0d-dd76da1f02a5">
+      <Terms xmlns="http://schemas.microsoft.com/office/infopath/2007/PartnerControls"/>
+    </ImageTagsTaxHTField>
+    <TaxCatchAll xmlns="230e9df3-be65-4c73-a93b-d1236ebd677e" xsi:nil="true"/>
+    <MediaServiceKeyPoints xmlns="71af3243-3dd4-4a8d-8c0d-dd76da1f02a5" xsi:nil="true"/>
+  </documentManagement>
+</p:properties>
 </file>
 
-<file path=customXml/itemProps2.xml><?xml version="1.0" encoding="utf-8"?>
-<ds:datastoreItem xmlns:ds="http://schemas.openxmlformats.org/officeDocument/2006/customXml" ds:itemID="{FABD9919-8F5A-4B99-83E1-E90FE1DCF2E1}">
-  <ds:schemaRefs>
-    <ds:schemaRef ds:uri="http://schemas.microsoft.com/sharepoint/v3/contenttype/forms"/>
-  </ds:schemaRefs>
-</ds:datastoreItem>
+<file path=customXml/item3.xml><?xml version="1.0" encoding="utf-8"?>
+<?mso-contentType ?>
+<FormTemplates xmlns="http://schemas.microsoft.com/sharepoint/v3/contenttype/forms">
+  <Display>DocumentLibraryForm</Display>
+  <Edit>DocumentLibraryForm</Edit>
+  <New>DocumentLibraryForm</New>
+</FormTemplates>
 </file>
 
-<file path=customXml/itemProps3.xml><?xml version="1.0" encoding="utf-8"?>
+<file path=customXml/itemProps1.xml><?xml version="1.0" encoding="utf-8"?>
 <ds:datastoreItem xmlns:ds="http://schemas.openxmlformats.org/officeDocument/2006/customXml" ds:itemID="{52D646E0-DCC8-4209-B539-AA58186B682C}">
   <ds:schemaRefs>
     <ds:schemaRef ds:uri="http://schemas.microsoft.com/office/2006/metadata/contentType"/>
@@ -13117,6 +14312,26 @@
 </ds:datastoreItem>
 </file>
 
+<file path=customXml/itemProps2.xml><?xml version="1.0" encoding="utf-8"?>
+<ds:datastoreItem xmlns:ds="http://schemas.openxmlformats.org/officeDocument/2006/customXml" ds:itemID="{80E87F72-70BF-43BC-A0D4-53665DC12672}">
+  <ds:schemaRefs>
+    <ds:schemaRef ds:uri="http://schemas.microsoft.com/office/2006/metadata/properties"/>
+    <ds:schemaRef ds:uri="http://schemas.microsoft.com/office/infopath/2007/PartnerControls"/>
+    <ds:schemaRef ds:uri="http://schemas.microsoft.com/sharepoint/v3"/>
+    <ds:schemaRef ds:uri="71af3243-3dd4-4a8d-8c0d-dd76da1f02a5"/>
+    <ds:schemaRef ds:uri="230e9df3-be65-4c73-a93b-d1236ebd677e"/>
+  </ds:schemaRefs>
+</ds:datastoreItem>
+</file>
+
+<file path=customXml/itemProps3.xml><?xml version="1.0" encoding="utf-8"?>
+<ds:datastoreItem xmlns:ds="http://schemas.openxmlformats.org/officeDocument/2006/customXml" ds:itemID="{FABD9919-8F5A-4B99-83E1-E90FE1DCF2E1}">
+  <ds:schemaRefs>
+    <ds:schemaRef ds:uri="http://schemas.microsoft.com/sharepoint/v3/contenttype/forms"/>
+  </ds:schemaRefs>
+</ds:datastoreItem>
+</file>
+
 <file path=docMetadata/LabelInfo.xml><?xml version="1.0" encoding="utf-8"?>
 <clbl:labelList xmlns:clbl="http://schemas.microsoft.com/office/2020/mipLabelMetadata"/>
 </file>
</xml_diff>